<commit_message>
Updated presentation for midproject review
</commit_message>
<xml_diff>
--- a/Documentation/WIPs/Midproject review presentation/Solving Solitaire game with AI review.pptx
+++ b/Documentation/WIPs/Midproject review presentation/Solving Solitaire game with AI review.pptx
@@ -14,6 +14,8 @@
     <p:sldId id="263" r:id="rId8"/>
     <p:sldId id="262" r:id="rId9"/>
     <p:sldId id="265" r:id="rId10"/>
+    <p:sldId id="266" r:id="rId11"/>
+    <p:sldId id="268" r:id="rId12"/>
   </p:sldIdLst>
   <p:sldSz cx="12192000" cy="6858000"/>
   <p:notesSz cx="6858000" cy="9144000"/>
@@ -112,6 +114,11 @@
       </a:defRPr>
     </a:lvl9pPr>
   </p:defaultTextStyle>
+  <p:extLst>
+    <p:ext uri="{EFAFB233-063F-42B5-8137-9DF3F51BA10A}">
+      <p15:sldGuideLst xmlns:p15="http://schemas.microsoft.com/office/powerpoint/2012/main"/>
+    </p:ext>
+  </p:extLst>
 </p:presentation>
 </file>
 
@@ -2462,7 +2469,7 @@
           <a:p>
             <a:fld id="{3C04E684-10F4-4CC3-A0B9-F03AA7BE37CF}" type="datetimeFigureOut">
               <a:rPr lang="en-US" smtClean="0"/>
-              <a:t>3/14/2023</a:t>
+              <a:t>3/20/2023</a:t>
             </a:fld>
             <a:endParaRPr lang="en-US"/>
           </a:p>
@@ -4952,7 +4959,7 @@
           <a:p>
             <a:fld id="{3C04E684-10F4-4CC3-A0B9-F03AA7BE37CF}" type="datetimeFigureOut">
               <a:rPr lang="en-US" smtClean="0"/>
-              <a:t>3/14/2023</a:t>
+              <a:t>3/20/2023</a:t>
             </a:fld>
             <a:endParaRPr lang="en-US"/>
           </a:p>
@@ -5150,7 +5157,7 @@
           <a:p>
             <a:fld id="{3C04E684-10F4-4CC3-A0B9-F03AA7BE37CF}" type="datetimeFigureOut">
               <a:rPr lang="en-US" smtClean="0"/>
-              <a:t>3/14/2023</a:t>
+              <a:t>3/20/2023</a:t>
             </a:fld>
             <a:endParaRPr lang="en-US"/>
           </a:p>
@@ -5358,7 +5365,7 @@
           <a:p>
             <a:fld id="{3C04E684-10F4-4CC3-A0B9-F03AA7BE37CF}" type="datetimeFigureOut">
               <a:rPr lang="en-US" smtClean="0"/>
-              <a:t>3/14/2023</a:t>
+              <a:t>3/20/2023</a:t>
             </a:fld>
             <a:endParaRPr lang="en-US"/>
           </a:p>
@@ -6095,7 +6102,7 @@
           <a:p>
             <a:fld id="{3C04E684-10F4-4CC3-A0B9-F03AA7BE37CF}" type="datetimeFigureOut">
               <a:rPr lang="en-US" smtClean="0"/>
-              <a:t>3/14/2023</a:t>
+              <a:t>3/20/2023</a:t>
             </a:fld>
             <a:endParaRPr lang="en-US"/>
           </a:p>
@@ -6737,7 +6744,7 @@
           <a:p>
             <a:fld id="{3C04E684-10F4-4CC3-A0B9-F03AA7BE37CF}" type="datetimeFigureOut">
               <a:rPr lang="en-US" smtClean="0"/>
-              <a:t>3/14/2023</a:t>
+              <a:t>3/20/2023</a:t>
             </a:fld>
             <a:endParaRPr lang="en-US"/>
           </a:p>
@@ -7537,7 +7544,7 @@
           <a:p>
             <a:fld id="{3C04E684-10F4-4CC3-A0B9-F03AA7BE37CF}" type="datetimeFigureOut">
               <a:rPr lang="en-US" smtClean="0"/>
-              <a:t>3/14/2023</a:t>
+              <a:t>3/20/2023</a:t>
             </a:fld>
             <a:endParaRPr lang="en-US"/>
           </a:p>
@@ -8488,7 +8495,7 @@
           <a:p>
             <a:fld id="{3C04E684-10F4-4CC3-A0B9-F03AA7BE37CF}" type="datetimeFigureOut">
               <a:rPr lang="en-US" smtClean="0"/>
-              <a:t>3/14/2023</a:t>
+              <a:t>3/20/2023</a:t>
             </a:fld>
             <a:endParaRPr lang="en-US"/>
           </a:p>
@@ -10837,7 +10844,7 @@
           <a:p>
             <a:fld id="{3C04E684-10F4-4CC3-A0B9-F03AA7BE37CF}" type="datetimeFigureOut">
               <a:rPr lang="en-US" smtClean="0"/>
-              <a:t>3/14/2023</a:t>
+              <a:t>3/20/2023</a:t>
             </a:fld>
             <a:endParaRPr lang="en-US"/>
           </a:p>
@@ -10950,7 +10957,7 @@
           <a:p>
             <a:fld id="{3C04E684-10F4-4CC3-A0B9-F03AA7BE37CF}" type="datetimeFigureOut">
               <a:rPr lang="en-US" smtClean="0"/>
-              <a:t>3/14/2023</a:t>
+              <a:t>3/20/2023</a:t>
             </a:fld>
             <a:endParaRPr lang="en-US"/>
           </a:p>
@@ -11457,7 +11464,7 @@
           <a:p>
             <a:fld id="{3C04E684-10F4-4CC3-A0B9-F03AA7BE37CF}" type="datetimeFigureOut">
               <a:rPr lang="en-US" smtClean="0"/>
-              <a:t>3/14/2023</a:t>
+              <a:t>3/20/2023</a:t>
             </a:fld>
             <a:endParaRPr lang="en-US"/>
           </a:p>
@@ -12760,7 +12767,7 @@
           <a:p>
             <a:fld id="{3C04E684-10F4-4CC3-A0B9-F03AA7BE37CF}" type="datetimeFigureOut">
               <a:rPr lang="en-US" smtClean="0"/>
-              <a:t>3/14/2023</a:t>
+              <a:t>3/20/2023</a:t>
             </a:fld>
             <a:endParaRPr lang="en-US"/>
           </a:p>
@@ -13007,7 +13014,7 @@
           <a:p>
             <a:fld id="{3C04E684-10F4-4CC3-A0B9-F03AA7BE37CF}" type="datetimeFigureOut">
               <a:rPr lang="en-US" smtClean="0"/>
-              <a:t>3/14/2023</a:t>
+              <a:t>3/20/2023</a:t>
             </a:fld>
             <a:endParaRPr lang="en-US"/>
           </a:p>
@@ -13995,6 +14002,211 @@
 </p:sld>
 </file>
 
+<file path=ppt/slides/slide10.xml><?xml version="1.0" encoding="utf-8"?>
+<p:sld xmlns:a="http://schemas.openxmlformats.org/drawingml/2006/main" xmlns:r="http://schemas.openxmlformats.org/officeDocument/2006/relationships" xmlns:p="http://schemas.openxmlformats.org/presentationml/2006/main">
+  <p:cSld>
+    <p:spTree>
+      <p:nvGrpSpPr>
+        <p:cNvPr id="1" name=""/>
+        <p:cNvGrpSpPr/>
+        <p:nvPr/>
+      </p:nvGrpSpPr>
+      <p:grpSpPr>
+        <a:xfrm>
+          <a:off x="0" y="0"/>
+          <a:ext cx="0" cy="0"/>
+          <a:chOff x="0" y="0"/>
+          <a:chExt cx="0" cy="0"/>
+        </a:xfrm>
+      </p:grpSpPr>
+      <p:sp>
+        <p:nvSpPr>
+          <p:cNvPr id="2" name="Title 1">
+            <a:extLst>
+              <a:ext uri="{FF2B5EF4-FFF2-40B4-BE49-F238E27FC236}">
+                <a16:creationId xmlns:a16="http://schemas.microsoft.com/office/drawing/2014/main" id="{9AC9DDD2-D0DC-623D-1448-AFDF735C255D}"/>
+              </a:ext>
+            </a:extLst>
+          </p:cNvPr>
+          <p:cNvSpPr>
+            <a:spLocks noGrp="1"/>
+          </p:cNvSpPr>
+          <p:nvPr>
+            <p:ph type="title"/>
+          </p:nvPr>
+        </p:nvSpPr>
+        <p:spPr/>
+        <p:txBody>
+          <a:bodyPr/>
+          <a:lstStyle/>
+          <a:p>
+            <a:r>
+              <a:rPr lang="en-GB" dirty="0"/>
+              <a:t>Current state of project</a:t>
+            </a:r>
+          </a:p>
+        </p:txBody>
+      </p:sp>
+      <p:sp>
+        <p:nvSpPr>
+          <p:cNvPr id="3" name="Content Placeholder 2">
+            <a:extLst>
+              <a:ext uri="{FF2B5EF4-FFF2-40B4-BE49-F238E27FC236}">
+                <a16:creationId xmlns:a16="http://schemas.microsoft.com/office/drawing/2014/main" id="{22CDFD9A-2AA3-7688-FCBD-AC7FE1B8A1E4}"/>
+              </a:ext>
+            </a:extLst>
+          </p:cNvPr>
+          <p:cNvSpPr>
+            <a:spLocks noGrp="1"/>
+          </p:cNvSpPr>
+          <p:nvPr>
+            <p:ph idx="1"/>
+          </p:nvPr>
+        </p:nvSpPr>
+        <p:spPr/>
+        <p:txBody>
+          <a:bodyPr/>
+          <a:lstStyle/>
+          <a:p>
+            <a:r>
+              <a:rPr lang="en-GB" dirty="0"/>
+              <a:t>Can currently solve 4x4 and 9x9 sudoku puzzles using the repair method.</a:t>
+            </a:r>
+          </a:p>
+          <a:p>
+            <a:endParaRPr lang="en-GB" dirty="0"/>
+          </a:p>
+          <a:p>
+            <a:r>
+              <a:rPr lang="en-GB" dirty="0"/>
+              <a:t>One component needed for the multi-objective version of the EA.</a:t>
+            </a:r>
+          </a:p>
+          <a:p>
+            <a:pPr marL="0" indent="0">
+              <a:buNone/>
+            </a:pPr>
+            <a:endParaRPr lang="en-GB" dirty="0"/>
+          </a:p>
+        </p:txBody>
+      </p:sp>
+    </p:spTree>
+    <p:extLst>
+      <p:ext uri="{BB962C8B-B14F-4D97-AF65-F5344CB8AC3E}">
+        <p14:creationId xmlns:p14="http://schemas.microsoft.com/office/powerpoint/2010/main" val="3066176657"/>
+      </p:ext>
+    </p:extLst>
+  </p:cSld>
+  <p:clrMapOvr>
+    <a:masterClrMapping/>
+  </p:clrMapOvr>
+</p:sld>
+</file>
+
+<file path=ppt/slides/slide11.xml><?xml version="1.0" encoding="utf-8"?>
+<p:sld xmlns:a="http://schemas.openxmlformats.org/drawingml/2006/main" xmlns:r="http://schemas.openxmlformats.org/officeDocument/2006/relationships" xmlns:p="http://schemas.openxmlformats.org/presentationml/2006/main">
+  <p:cSld>
+    <p:spTree>
+      <p:nvGrpSpPr>
+        <p:cNvPr id="1" name=""/>
+        <p:cNvGrpSpPr/>
+        <p:nvPr/>
+      </p:nvGrpSpPr>
+      <p:grpSpPr>
+        <a:xfrm>
+          <a:off x="0" y="0"/>
+          <a:ext cx="0" cy="0"/>
+          <a:chOff x="0" y="0"/>
+          <a:chExt cx="0" cy="0"/>
+        </a:xfrm>
+      </p:grpSpPr>
+      <p:sp>
+        <p:nvSpPr>
+          <p:cNvPr id="2" name="Title 1">
+            <a:extLst>
+              <a:ext uri="{FF2B5EF4-FFF2-40B4-BE49-F238E27FC236}">
+                <a16:creationId xmlns:a16="http://schemas.microsoft.com/office/drawing/2014/main" id="{69F7CDC0-C674-2A91-FCE5-07E2E1CFB4AC}"/>
+              </a:ext>
+            </a:extLst>
+          </p:cNvPr>
+          <p:cNvSpPr>
+            <a:spLocks noGrp="1"/>
+          </p:cNvSpPr>
+          <p:nvPr>
+            <p:ph type="title"/>
+          </p:nvPr>
+        </p:nvSpPr>
+        <p:spPr/>
+        <p:txBody>
+          <a:bodyPr/>
+          <a:lstStyle/>
+          <a:p>
+            <a:r>
+              <a:rPr lang="en-GB" dirty="0"/>
+              <a:t>Stretch goals for the project</a:t>
+            </a:r>
+          </a:p>
+        </p:txBody>
+      </p:sp>
+      <p:sp>
+        <p:nvSpPr>
+          <p:cNvPr id="3" name="Content Placeholder 2">
+            <a:extLst>
+              <a:ext uri="{FF2B5EF4-FFF2-40B4-BE49-F238E27FC236}">
+                <a16:creationId xmlns:a16="http://schemas.microsoft.com/office/drawing/2014/main" id="{2C0971AB-3204-77FA-6D39-1CE5E0835574}"/>
+              </a:ext>
+            </a:extLst>
+          </p:cNvPr>
+          <p:cNvSpPr>
+            <a:spLocks noGrp="1"/>
+          </p:cNvSpPr>
+          <p:nvPr>
+            <p:ph idx="1"/>
+          </p:nvPr>
+        </p:nvSpPr>
+        <p:spPr/>
+        <p:txBody>
+          <a:bodyPr/>
+          <a:lstStyle/>
+          <a:p>
+            <a:r>
+              <a:rPr lang="en-GB" dirty="0"/>
+              <a:t>Have repair based method working up to 16x16 sudoku.</a:t>
+            </a:r>
+          </a:p>
+          <a:p>
+            <a:endParaRPr lang="en-GB" dirty="0"/>
+          </a:p>
+          <a:p>
+            <a:r>
+              <a:rPr lang="en-GB" dirty="0"/>
+              <a:t>Have multi-objective method working up to 16x16 sudoku.</a:t>
+            </a:r>
+          </a:p>
+          <a:p>
+            <a:endParaRPr lang="en-GB" dirty="0"/>
+          </a:p>
+          <a:p>
+            <a:r>
+              <a:rPr lang="en-GB" dirty="0"/>
+              <a:t>Have a small GUI for inputting grid values and outputting the result.</a:t>
+            </a:r>
+          </a:p>
+        </p:txBody>
+      </p:sp>
+    </p:spTree>
+    <p:extLst>
+      <p:ext uri="{BB962C8B-B14F-4D97-AF65-F5344CB8AC3E}">
+        <p14:creationId xmlns:p14="http://schemas.microsoft.com/office/powerpoint/2010/main" val="1848142902"/>
+      </p:ext>
+    </p:extLst>
+  </p:cSld>
+  <p:clrMapOvr>
+    <a:masterClrMapping/>
+  </p:clrMapOvr>
+</p:sld>
+</file>
+
 <file path=ppt/slides/slide2.xml><?xml version="1.0" encoding="utf-8"?>
 <p:sld xmlns:a="http://schemas.openxmlformats.org/drawingml/2006/main" xmlns:r="http://schemas.openxmlformats.org/officeDocument/2006/relationships" xmlns:p="http://schemas.openxmlformats.org/presentationml/2006/main">
   <p:cSld>
@@ -14069,7 +14281,7 @@
           <a:p>
             <a:r>
               <a:rPr lang="en-GB" dirty="0"/>
-              <a:t>The method I have chosen to solve Sudoku is Evolutionary algorithms. </a:t>
+              <a:t>The method I have chosen to solve Sudoku is Evolutionary algorithms(EA). </a:t>
             </a:r>
           </a:p>
           <a:p>
@@ -14162,30 +14374,41 @@
         </p:nvSpPr>
         <p:spPr/>
         <p:txBody>
-          <a:bodyPr/>
+          <a:bodyPr>
+            <a:normAutofit fontScale="92500" lnSpcReduction="10000"/>
+          </a:bodyPr>
           <a:lstStyle/>
           <a:p>
             <a:r>
               <a:rPr lang="en-GB" dirty="0"/>
-              <a:t>Take a Sudoku puzzle as an input</a:t>
+              <a:t>Take a Sudoku puzzle of different sizes as an input i.e. 4x4 or 9x9.</a:t>
             </a:r>
+          </a:p>
+          <a:p>
+            <a:endParaRPr lang="en-GB" dirty="0"/>
           </a:p>
           <a:p>
             <a:r>
               <a:rPr lang="en-GB" dirty="0"/>
-              <a:t>Use EA with repair method constraints to generate a solution if there is one</a:t>
+              <a:t>Use EA with repair method to handle constraints violations.</a:t>
             </a:r>
+          </a:p>
+          <a:p>
+            <a:endParaRPr lang="en-GB" dirty="0"/>
           </a:p>
           <a:p>
             <a:r>
               <a:rPr lang="en-GB" dirty="0"/>
-              <a:t>Use multi objective EA without a repair method to generate a solution if there is one</a:t>
+              <a:t>Use multi-objective EA without a repair method to generate a solution if there is one.</a:t>
             </a:r>
+          </a:p>
+          <a:p>
+            <a:endParaRPr lang="en-GB" dirty="0"/>
           </a:p>
           <a:p>
             <a:r>
               <a:rPr lang="en-GB" dirty="0"/>
-              <a:t>Compare EA with repair method to multi objective EA</a:t>
+              <a:t>Compare EA with repair method to multi objective EA.</a:t>
             </a:r>
           </a:p>
         </p:txBody>
@@ -14243,7 +14466,7 @@
           <a:p>
             <a:r>
               <a:rPr lang="en-GB" dirty="0"/>
-              <a:t>Search space/ Encoding</a:t>
+              <a:t>Encoding/Search space</a:t>
             </a:r>
           </a:p>
         </p:txBody>
@@ -14269,9 +14492,6 @@
           <a:bodyPr/>
           <a:lstStyle/>
           <a:p>
-            <a:pPr marL="0" indent="0">
-              <a:buNone/>
-            </a:pPr>
             <a:r>
               <a:rPr lang="en-GB" dirty="0"/>
               <a:t>Encoding for the algorithm will be represented using a integer encoding of 0-n, where n is the size of the puzzle. </a:t>
@@ -14284,9 +14504,6 @@
             <a:endParaRPr lang="en-GB" dirty="0"/>
           </a:p>
           <a:p>
-            <a:pPr marL="0" indent="0">
-              <a:buNone/>
-            </a:pPr>
             <a:r>
               <a:rPr lang="en-GB" dirty="0"/>
               <a:t>This is stored in a n x n array, along with a second array which stores the initial positions of the puzzle.</a:t>
@@ -14379,12 +14596,9 @@
           <a:bodyPr/>
           <a:lstStyle/>
           <a:p>
-            <a:pPr marL="0" indent="0">
-              <a:buNone/>
-            </a:pPr>
             <a:r>
               <a:rPr lang="en-GB" dirty="0"/>
-              <a:t>The fitness function used will evaluate the puzzles state will be quite simple, it will look at one thing, the number of filled spaces within the puzzle. </a:t>
+              <a:t>The fitness function used will evaluate the will evaluate the number of filled spaces within the puzzle. </a:t>
             </a:r>
           </a:p>
           <a:p>
@@ -14394,9 +14608,6 @@
             <a:endParaRPr lang="en-GB" dirty="0"/>
           </a:p>
           <a:p>
-            <a:pPr marL="0" indent="0">
-              <a:buNone/>
-            </a:pPr>
             <a:r>
               <a:rPr lang="en-GB" dirty="0"/>
               <a:t>To deal with how simple the fitness function is here, the program will also use constraint handling.</a:t>
@@ -14483,30 +14694,27 @@
           <a:bodyPr/>
           <a:lstStyle/>
           <a:p>
-            <a:pPr marL="0" indent="0">
-              <a:buNone/>
-            </a:pPr>
             <a:r>
               <a:rPr lang="en-GB" dirty="0"/>
-              <a:t>For the handling of constraints, the program uses a repair method.</a:t>
+              <a:t>For the handling of constraints uses a repair method.</a:t>
             </a:r>
           </a:p>
           <a:p>
-            <a:pPr marL="0" indent="0">
-              <a:buNone/>
-            </a:pPr>
+            <a:endParaRPr lang="en-GB" dirty="0"/>
+          </a:p>
+          <a:p>
             <a:r>
               <a:rPr lang="en-GB" dirty="0"/>
-              <a:t>The repair method will have 3 constraints to get towards a feasible solution, which are the grid rule, or either of the line rule violations. </a:t>
+              <a:t>There will be 3 constraints, which are the same number being in a grid, row or column. </a:t>
             </a:r>
           </a:p>
           <a:p>
-            <a:pPr marL="0" indent="0">
-              <a:buNone/>
-            </a:pPr>
+            <a:endParaRPr lang="en-GB" dirty="0"/>
+          </a:p>
+          <a:p>
             <a:r>
               <a:rPr lang="en-GB" dirty="0"/>
-              <a:t>The program will find all of the constraint violations and randomly remove one, if this creates a feasible solution it moves on, if not it will keep trying to repair.</a:t>
+              <a:t>The repair finds all the constraint violations and removes the highest conflicting square which is not in the initial population.</a:t>
             </a:r>
           </a:p>
           <a:p>
@@ -14674,7 +14882,7 @@
           <a:p>
             <a:r>
               <a:rPr lang="en-GB" dirty="0"/>
-              <a:t>Alternative method</a:t>
+              <a:t>Multi-objective </a:t>
             </a:r>
           </a:p>
         </p:txBody>
@@ -14700,21 +14908,21 @@
           <a:bodyPr/>
           <a:lstStyle/>
           <a:p>
+            <a:r>
+              <a:rPr lang="en-GB" dirty="0"/>
+              <a:t>Will be a similar program that uses multi-objective evolutionary algorithms, and no repair method.</a:t>
+            </a:r>
+          </a:p>
+          <a:p>
             <a:pPr marL="0" indent="0">
               <a:buNone/>
             </a:pPr>
+            <a:endParaRPr lang="en-GB" dirty="0"/>
+          </a:p>
+          <a:p>
             <a:r>
               <a:rPr lang="en-GB" dirty="0"/>
-              <a:t>There will be a similar program that works with multiple objective evolutionary algorithms, that will use no repair method and have two objectives. </a:t>
-            </a:r>
-          </a:p>
-          <a:p>
-            <a:pPr marL="0" indent="0">
-              <a:buNone/>
-            </a:pPr>
-            <a:r>
-              <a:rPr lang="en-GB" dirty="0"/>
-              <a:t>These objectives are, number of spaces filled and the number of constraint violations.</a:t>
+              <a:t>Will have two objectives, number of spaces filled and the number of constraint violations.</a:t>
             </a:r>
           </a:p>
         </p:txBody>
@@ -14803,7 +15011,40 @@
             </a:pPr>
             <a:r>
               <a:rPr lang="en-GB" dirty="0"/>
-              <a:t>The project will overall compares the two methods described based on, how fast they can solve the puzzles and how many puzzles each method gets stuck on, it will also consider and sort them into other factors, such as puzzle size, and human puzzle difficulty. </a:t>
+              <a:t>The methods will be compared on:</a:t>
+            </a:r>
+          </a:p>
+          <a:p>
+            <a:r>
+              <a:rPr lang="en-GB" dirty="0"/>
+              <a:t>Runtime</a:t>
+            </a:r>
+          </a:p>
+          <a:p>
+            <a:r>
+              <a:rPr lang="en-GB" dirty="0"/>
+              <a:t>Number of puzzles failed</a:t>
+            </a:r>
+          </a:p>
+          <a:p>
+            <a:pPr marL="0" indent="0">
+              <a:buNone/>
+            </a:pPr>
+            <a:r>
+              <a:rPr lang="en-GB" dirty="0"/>
+              <a:t>And compare them for different: </a:t>
+            </a:r>
+          </a:p>
+          <a:p>
+            <a:r>
+              <a:rPr lang="en-GB" dirty="0"/>
+              <a:t>Puzzle sizes </a:t>
+            </a:r>
+          </a:p>
+          <a:p>
+            <a:r>
+              <a:rPr lang="en-GB" dirty="0"/>
+              <a:t>Puzzle difficulty. </a:t>
             </a:r>
           </a:p>
         </p:txBody>

</xml_diff>